<commit_message>
Added slides 5 -> 20
</commit_message>
<xml_diff>
--- a/Presentation/Presentation.pptx
+++ b/Presentation/Presentation.pptx
@@ -377,11 +377,11 @@
         </c:dLbls>
         <c:marker val="1"/>
         <c:smooth val="0"/>
-        <c:axId val="42448384"/>
-        <c:axId val="42035456"/>
+        <c:axId val="105147904"/>
+        <c:axId val="88996032"/>
       </c:lineChart>
       <c:catAx>
-        <c:axId val="42448384"/>
+        <c:axId val="105147904"/>
         <c:scaling>
           <c:orientation val="minMax"/>
         </c:scaling>
@@ -401,7 +401,7 @@
             <a:endParaRPr lang="pt-PT"/>
           </a:p>
         </c:txPr>
-        <c:crossAx val="42035456"/>
+        <c:crossAx val="88996032"/>
         <c:crosses val="autoZero"/>
         <c:auto val="1"/>
         <c:lblAlgn val="ctr"/>
@@ -409,7 +409,7 @@
         <c:noMultiLvlLbl val="0"/>
       </c:catAx>
       <c:valAx>
-        <c:axId val="42035456"/>
+        <c:axId val="88996032"/>
         <c:scaling>
           <c:orientation val="minMax"/>
         </c:scaling>
@@ -428,7 +428,7 @@
         <c:majorTickMark val="out"/>
         <c:minorTickMark val="none"/>
         <c:tickLblPos val="nextTo"/>
-        <c:crossAx val="42448384"/>
+        <c:crossAx val="105147904"/>
         <c:crosses val="autoZero"/>
         <c:crossBetween val="between"/>
       </c:valAx>
@@ -535,7 +535,7 @@
           <a:p>
             <a:fld id="{21EC9149-67E8-448A-8434-24835FD538DE}" type="datetimeFigureOut">
               <a:rPr lang="en-US" smtClean="0"/>
-              <a:t>10/27/2021</a:t>
+              <a:t>10/29/2021</a:t>
             </a:fld>
             <a:endParaRPr lang="en-US"/>
           </a:p>
@@ -1152,7 +1152,7 @@
           <a:p>
             <a:fld id="{6EE8D08E-F3AD-425B-B504-BB05E08BC299}" type="datetimeFigureOut">
               <a:rPr lang="en-US" smtClean="0"/>
-              <a:t>10/27/2021</a:t>
+              <a:t>10/29/2021</a:t>
             </a:fld>
             <a:endParaRPr lang="en-US"/>
           </a:p>
@@ -1322,7 +1322,7 @@
           <a:p>
             <a:fld id="{6EE8D08E-F3AD-425B-B504-BB05E08BC299}" type="datetimeFigureOut">
               <a:rPr lang="en-US" smtClean="0"/>
-              <a:t>10/27/2021</a:t>
+              <a:t>10/29/2021</a:t>
             </a:fld>
             <a:endParaRPr lang="en-US"/>
           </a:p>
@@ -1502,7 +1502,7 @@
           <a:p>
             <a:fld id="{6EE8D08E-F3AD-425B-B504-BB05E08BC299}" type="datetimeFigureOut">
               <a:rPr lang="en-US" smtClean="0"/>
-              <a:t>10/27/2021</a:t>
+              <a:t>10/29/2021</a:t>
             </a:fld>
             <a:endParaRPr lang="en-US"/>
           </a:p>
@@ -1672,7 +1672,7 @@
           <a:p>
             <a:fld id="{6EE8D08E-F3AD-425B-B504-BB05E08BC299}" type="datetimeFigureOut">
               <a:rPr lang="en-US" smtClean="0"/>
-              <a:t>10/27/2021</a:t>
+              <a:t>10/29/2021</a:t>
             </a:fld>
             <a:endParaRPr lang="en-US"/>
           </a:p>
@@ -1918,7 +1918,7 @@
           <a:p>
             <a:fld id="{6EE8D08E-F3AD-425B-B504-BB05E08BC299}" type="datetimeFigureOut">
               <a:rPr lang="en-US" smtClean="0"/>
-              <a:t>10/27/2021</a:t>
+              <a:t>10/29/2021</a:t>
             </a:fld>
             <a:endParaRPr lang="en-US"/>
           </a:p>
@@ -2206,7 +2206,7 @@
           <a:p>
             <a:fld id="{6EE8D08E-F3AD-425B-B504-BB05E08BC299}" type="datetimeFigureOut">
               <a:rPr lang="en-US" smtClean="0"/>
-              <a:t>10/27/2021</a:t>
+              <a:t>10/29/2021</a:t>
             </a:fld>
             <a:endParaRPr lang="en-US"/>
           </a:p>
@@ -2628,7 +2628,7 @@
           <a:p>
             <a:fld id="{6EE8D08E-F3AD-425B-B504-BB05E08BC299}" type="datetimeFigureOut">
               <a:rPr lang="en-US" smtClean="0"/>
-              <a:t>10/27/2021</a:t>
+              <a:t>10/29/2021</a:t>
             </a:fld>
             <a:endParaRPr lang="en-US"/>
           </a:p>
@@ -2746,7 +2746,7 @@
           <a:p>
             <a:fld id="{6EE8D08E-F3AD-425B-B504-BB05E08BC299}" type="datetimeFigureOut">
               <a:rPr lang="en-US" smtClean="0"/>
-              <a:t>10/27/2021</a:t>
+              <a:t>10/29/2021</a:t>
             </a:fld>
             <a:endParaRPr lang="en-US"/>
           </a:p>
@@ -2841,7 +2841,7 @@
           <a:p>
             <a:fld id="{6EE8D08E-F3AD-425B-B504-BB05E08BC299}" type="datetimeFigureOut">
               <a:rPr lang="en-US" smtClean="0"/>
-              <a:t>10/27/2021</a:t>
+              <a:t>10/29/2021</a:t>
             </a:fld>
             <a:endParaRPr lang="en-US"/>
           </a:p>
@@ -3118,7 +3118,7 @@
           <a:p>
             <a:fld id="{6EE8D08E-F3AD-425B-B504-BB05E08BC299}" type="datetimeFigureOut">
               <a:rPr lang="en-US" smtClean="0"/>
-              <a:t>10/27/2021</a:t>
+              <a:t>10/29/2021</a:t>
             </a:fld>
             <a:endParaRPr lang="en-US"/>
           </a:p>
@@ -3371,7 +3371,7 @@
           <a:p>
             <a:fld id="{6EE8D08E-F3AD-425B-B504-BB05E08BC299}" type="datetimeFigureOut">
               <a:rPr lang="en-US" smtClean="0"/>
-              <a:t>10/27/2021</a:t>
+              <a:t>10/29/2021</a:t>
             </a:fld>
             <a:endParaRPr lang="en-US"/>
           </a:p>
@@ -3584,7 +3584,7 @@
           <a:p>
             <a:fld id="{6EE8D08E-F3AD-425B-B504-BB05E08BC299}" type="datetimeFigureOut">
               <a:rPr lang="en-US" smtClean="0"/>
-              <a:t>10/27/2021</a:t>
+              <a:t>10/29/2021</a:t>
             </a:fld>
             <a:endParaRPr lang="en-US"/>
           </a:p>
@@ -3984,10 +3984,6 @@
             <a:r>
               <a:rPr lang="en-US" dirty="0" smtClean="0"/>
               <a:t>Reflective Regret</a:t>
-            </a:r>
-            <a:r>
-              <a:rPr lang="en-US" dirty="0" smtClean="0"/>
-              <a:t/>
             </a:r>
             <a:br>
               <a:rPr lang="en-US" dirty="0" smtClean="0"/>
@@ -8183,8 +8179,12 @@
           <a:lstStyle/>
           <a:p>
             <a:r>
-              <a:rPr lang="en-US" dirty="0" smtClean="0"/>
-              <a:t>Its unlikely you’ll have access to official hardware or software (not that it helps, a lot of it is finicky or annoying to use).</a:t>
+              <a:rPr lang="en-US" smtClean="0"/>
+              <a:t>It’s </a:t>
+            </a:r>
+            <a:r>
+              <a:rPr lang="en-US" dirty="0" smtClean="0"/>
+              <a:t>unlikely you’ll have access to official hardware or software (not that it helps, a lot of it is finicky or annoying to use).</a:t>
             </a:r>
           </a:p>
           <a:p>
@@ -13863,11 +13863,7 @@
             </a:r>
             <a:r>
               <a:rPr lang="en-US" dirty="0" smtClean="0"/>
-              <a:t>codes and documentation scribbled on a used paper napkin</a:t>
-            </a:r>
-            <a:r>
-              <a:rPr lang="en-US" dirty="0" smtClean="0"/>
-              <a:t>.</a:t>
+              <a:t>codes and documentation scribbled on a used paper napkin.</a:t>
             </a:r>
           </a:p>
           <a:p>
@@ -13879,7 +13875,6 @@
               <a:rPr lang="en-US" dirty="0"/>
               <a:t>r64emu</a:t>
             </a:r>
-            <a:endParaRPr lang="en-US" dirty="0"/>
           </a:p>
         </p:txBody>
       </p:sp>

</xml_diff>

<commit_message>
Almost done! Just missing 2 demonstrations
</commit_message>
<xml_diff>
--- a/Presentation/Presentation.pptx
+++ b/Presentation/Presentation.pptx
@@ -4339,7 +4339,19 @@
             </a:pPr>
             <a:r>
               <a:rPr lang="en-US" dirty="0" smtClean="0"/>
-              <a:t>Tiny texture cache (4KB!?)</a:t>
+              <a:t>Tiny texture cache (4KB</a:t>
+            </a:r>
+            <a:r>
+              <a:rPr lang="en-US" dirty="0"/>
+              <a:t>!?). </a:t>
+            </a:r>
+            <a:r>
+              <a:rPr lang="en-US"/>
+              <a:t>Manual </a:t>
+            </a:r>
+            <a:r>
+              <a:rPr lang="en-US" smtClean="0"/>
+              <a:t>syncing.</a:t>
             </a:r>
             <a:endParaRPr lang="en-US" dirty="0"/>
           </a:p>
@@ -8179,7 +8191,7 @@
           <a:lstStyle/>
           <a:p>
             <a:r>
-              <a:rPr lang="en-US" smtClean="0"/>
+              <a:rPr lang="en-US" dirty="0" smtClean="0"/>
               <a:t>It’s </a:t>
             </a:r>
             <a:r>
@@ -13780,12 +13792,12 @@
               <a:t>, </a:t>
             </a:r>
             <a:r>
-              <a:rPr lang="en-US" b="1" dirty="0"/>
+              <a:rPr lang="en-US" b="1" dirty="0" smtClean="0"/>
               <a:t>Fast3D</a:t>
             </a:r>
             <a:r>
               <a:rPr lang="en-US" dirty="0" smtClean="0"/>
-              <a:t> </a:t>
+              <a:t>, </a:t>
             </a:r>
             <a:r>
               <a:rPr lang="en-US" dirty="0" err="1" smtClean="0"/>
@@ -14150,8 +14162,17 @@
           <a:p>
             <a:r>
               <a:rPr lang="en-US" dirty="0" smtClean="0"/>
-              <a:t>If you do hit it, there’s ways around it</a:t>
-            </a:r>
+              <a:t>If you do hit it, </a:t>
+            </a:r>
+            <a:r>
+              <a:rPr lang="en-US" dirty="0" smtClean="0"/>
+              <a:t>are solutions</a:t>
+            </a:r>
+            <a:r>
+              <a:rPr lang="en-US" dirty="0" smtClean="0"/>
+              <a:t>:</a:t>
+            </a:r>
+            <a:endParaRPr lang="en-US" dirty="0" smtClean="0"/>
           </a:p>
           <a:p>
             <a:pPr lvl="1">
@@ -14587,8 +14608,13 @@
           <a:p>
             <a:r>
               <a:rPr lang="en-US" dirty="0" smtClean="0"/>
-              <a:t>Very simple equation:</a:t>
-            </a:r>
+              <a:t>Very simple </a:t>
+            </a:r>
+            <a:r>
+              <a:rPr lang="en-US" dirty="0" smtClean="0"/>
+              <a:t>equation:</a:t>
+            </a:r>
+            <a:endParaRPr lang="en-US" dirty="0" smtClean="0"/>
           </a:p>
           <a:p>
             <a:endParaRPr lang="en-US" dirty="0"/>
@@ -14819,8 +14845,13 @@
           <a:p>
             <a:r>
               <a:rPr lang="en-US" dirty="0" smtClean="0"/>
-              <a:t>Blends colors set from CC to the ones in the framebuffer. Also does Anti-Aliasing and Z-Buffering.</a:t>
-            </a:r>
+              <a:t>Blends colors set from CC to the ones in the framebuffer. Also does Anti-Aliasing and </a:t>
+            </a:r>
+            <a:r>
+              <a:rPr lang="en-US" dirty="0" smtClean="0"/>
+              <a:t>Z-Buffering.</a:t>
+            </a:r>
+            <a:endParaRPr lang="en-US" dirty="0" smtClean="0"/>
           </a:p>
           <a:p>
             <a:r>
@@ -15593,7 +15624,11 @@
             </a:pPr>
             <a:r>
               <a:rPr lang="en-US" dirty="0" smtClean="0"/>
-              <a:t>Selectively disable the Z-Buffer.</a:t>
+              <a:t>Selectively </a:t>
+            </a:r>
+            <a:r>
+              <a:rPr lang="en-US" dirty="0" smtClean="0"/>
+              <a:t>disable the Z-Buffer.</a:t>
             </a:r>
           </a:p>
           <a:p>
@@ -16978,7 +17013,7 @@
         </p:spPr>
         <p:txBody>
           <a:bodyPr>
-            <a:normAutofit fontScale="92500" lnSpcReduction="20000"/>
+            <a:normAutofit fontScale="85000" lnSpcReduction="20000"/>
           </a:bodyPr>
           <a:lstStyle/>
           <a:p>
@@ -17004,19 +17039,62 @@
             </a:r>
             <a:r>
               <a:rPr lang="en-US" dirty="0" smtClean="0"/>
-              <a:t> merges with alt_libn64</a:t>
-            </a:r>
-          </a:p>
-          <a:p>
-            <a:r>
-              <a:rPr lang="en-US" dirty="0" smtClean="0"/>
-              <a:t>2016 – N64Brew is created</a:t>
-            </a:r>
-          </a:p>
-          <a:p>
-            <a:r>
-              <a:rPr lang="en-US" dirty="0" smtClean="0"/>
-              <a:t>2018 – Pyoro64</a:t>
+              <a:t> merges with </a:t>
+            </a:r>
+            <a:r>
+              <a:rPr lang="en-US" dirty="0" smtClean="0"/>
+              <a:t>alt_libn64</a:t>
+            </a:r>
+          </a:p>
+          <a:p>
+            <a:r>
+              <a:rPr lang="en-US" dirty="0" smtClean="0"/>
+              <a:t>2011 – </a:t>
+            </a:r>
+            <a:r>
+              <a:rPr lang="en-US" dirty="0" err="1" smtClean="0"/>
+              <a:t>marshallh’s</a:t>
+            </a:r>
+            <a:r>
+              <a:rPr lang="en-US" dirty="0" smtClean="0"/>
+              <a:t> MGC demo, CIC is </a:t>
+            </a:r>
+            <a:r>
+              <a:rPr lang="en-US" dirty="0" err="1" smtClean="0"/>
+              <a:t>RE’d</a:t>
+            </a:r>
+            <a:r>
+              <a:rPr lang="en-US" dirty="0" smtClean="0"/>
+              <a:t>, </a:t>
+            </a:r>
+            <a:r>
+              <a:rPr lang="en-US" dirty="0"/>
+              <a:t>64Drive is released</a:t>
+            </a:r>
+            <a:endParaRPr lang="en-US" dirty="0" smtClean="0"/>
+          </a:p>
+          <a:p>
+            <a:r>
+              <a:rPr lang="en-US" dirty="0" smtClean="0"/>
+              <a:t>2016 </a:t>
+            </a:r>
+            <a:r>
+              <a:rPr lang="en-US" dirty="0" smtClean="0"/>
+              <a:t>– N64Brew is </a:t>
+            </a:r>
+            <a:r>
+              <a:rPr lang="en-US" dirty="0" smtClean="0"/>
+              <a:t>created</a:t>
+            </a:r>
+          </a:p>
+          <a:p>
+            <a:r>
+              <a:rPr lang="en-US" dirty="0" smtClean="0"/>
+              <a:t>2018 </a:t>
+            </a:r>
+            <a:r>
+              <a:rPr lang="en-US" dirty="0" smtClean="0"/>
+              <a:t>– Pyoro64</a:t>
             </a:r>
           </a:p>
           <a:p>
@@ -17056,7 +17134,10 @@
             </a:r>
           </a:p>
           <a:p>
-            <a:pPr lvl="1"/>
+            <a:pPr lvl="1">
+              <a:buFont typeface="Courier New" panose="02070309020205020404" pitchFamily="49" charset="0"/>
+              <a:buChar char="o"/>
+            </a:pPr>
             <a:r>
               <a:rPr lang="en-US" dirty="0"/>
               <a:t>Creation of the </a:t>
@@ -17491,7 +17572,19 @@
             </a:r>
             <a:r>
               <a:rPr lang="en-US" dirty="0" smtClean="0"/>
-              <a:t> for proofreading, correcting me, and answering questions.</a:t>
+              <a:t>, </a:t>
+            </a:r>
+            <a:r>
+              <a:rPr lang="en-US" dirty="0" err="1" smtClean="0"/>
+              <a:t>mikeryan</a:t>
+            </a:r>
+            <a:r>
+              <a:rPr lang="en-US" dirty="0" smtClean="0"/>
+              <a:t> </a:t>
+            </a:r>
+            <a:r>
+              <a:rPr lang="en-US" dirty="0" smtClean="0"/>
+              <a:t>for proofreading, correcting me, and answering questions.</a:t>
             </a:r>
           </a:p>
           <a:p>
@@ -17516,11 +17609,11 @@
               <a:t>, </a:t>
             </a:r>
             <a:r>
-              <a:rPr lang="en-US" dirty="0" err="1" smtClean="0"/>
-              <a:t>MikeRyan</a:t>
-            </a:r>
-            <a:r>
-              <a:rPr lang="en-US" dirty="0" smtClean="0"/>
+              <a:rPr lang="en-US" dirty="0" err="1"/>
+              <a:t>mikeryan</a:t>
+            </a:r>
+            <a:r>
+              <a:rPr lang="en-US" dirty="0"/>
               <a:t>, </a:t>
             </a:r>
             <a:r>
@@ -17943,10 +18036,9 @@
               </a:rPr>
               <a:t>www.dextrose.com/dx_index.htm</a:t>
             </a:r>
-            <a:r>
-              <a:rPr lang="en-US" dirty="0" smtClean="0"/>
-              <a:t> </a:t>
-            </a:r>
+            <a:endParaRPr lang="en-US" dirty="0"/>
+          </a:p>
+          <a:p>
             <a:r>
               <a:rPr lang="en-US" dirty="0" smtClean="0">
                 <a:hlinkClick r:id="rId8"/>

</xml_diff>